<commit_message>
finished stuff for seminarday 2
</commit_message>
<xml_diff>
--- a/5_seminar/contents_part_II/slides/slides_II_3.pptx
+++ b/5_seminar/contents_part_II/slides/slides_II_3.pptx
@@ -243,7 +243,7 @@
           <a:p>
             <a:fld id="{7A5B87F2-13FD-4A24-9F19-39B31C60B536}" type="datetimeFigureOut">
               <a:rPr lang="en-US" smtClean="0"/>
-              <a:t>5/5/2021</a:t>
+              <a:t>5/6/2021</a:t>
             </a:fld>
             <a:endParaRPr lang="en-US"/>
           </a:p>
@@ -3711,7 +3711,7 @@
           <a:p>
             <a:fld id="{5A1811BA-6AD9-41A7-B7A2-456C8523519C}" type="datetime1">
               <a:rPr lang="en-US" smtClean="0"/>
-              <a:t>5/5/2021</a:t>
+              <a:t>5/6/2021</a:t>
             </a:fld>
             <a:endParaRPr lang="en-US"/>
           </a:p>
@@ -3881,7 +3881,7 @@
           <a:p>
             <a:fld id="{B0494441-C196-4BB0-93EE-AF22360207AB}" type="datetime1">
               <a:rPr lang="en-US" smtClean="0"/>
-              <a:t>5/5/2021</a:t>
+              <a:t>5/6/2021</a:t>
             </a:fld>
             <a:endParaRPr lang="en-US"/>
           </a:p>
@@ -4061,7 +4061,7 @@
           <a:p>
             <a:fld id="{D7B9282B-C3CE-4F56-8DD1-5349F982F1D2}" type="datetime1">
               <a:rPr lang="en-US" smtClean="0"/>
-              <a:t>5/5/2021</a:t>
+              <a:t>5/6/2021</a:t>
             </a:fld>
             <a:endParaRPr lang="en-US"/>
           </a:p>
@@ -4231,7 +4231,7 @@
           <a:p>
             <a:fld id="{E6E86D6A-786F-4E85-AF3B-385015383ABA}" type="datetime1">
               <a:rPr lang="en-US" smtClean="0"/>
-              <a:t>5/5/2021</a:t>
+              <a:t>5/6/2021</a:t>
             </a:fld>
             <a:endParaRPr lang="en-US"/>
           </a:p>
@@ -4477,7 +4477,7 @@
           <a:p>
             <a:fld id="{051FFEB0-9C80-4A34-A5C7-72D52D52FC7D}" type="datetime1">
               <a:rPr lang="en-US" smtClean="0"/>
-              <a:t>5/5/2021</a:t>
+              <a:t>5/6/2021</a:t>
             </a:fld>
             <a:endParaRPr lang="en-US"/>
           </a:p>
@@ -4709,7 +4709,7 @@
           <a:p>
             <a:fld id="{084267AD-C299-471B-ABA1-D0EA94C7EDCF}" type="datetime1">
               <a:rPr lang="en-US" smtClean="0"/>
-              <a:t>5/5/2021</a:t>
+              <a:t>5/6/2021</a:t>
             </a:fld>
             <a:endParaRPr lang="en-US"/>
           </a:p>
@@ -5076,7 +5076,7 @@
           <a:p>
             <a:fld id="{6468DBC7-10F8-46A1-8CE1-DBB0A6F0EF3E}" type="datetime1">
               <a:rPr lang="en-US" smtClean="0"/>
-              <a:t>5/5/2021</a:t>
+              <a:t>5/6/2021</a:t>
             </a:fld>
             <a:endParaRPr lang="en-US"/>
           </a:p>
@@ -5194,7 +5194,7 @@
           <a:p>
             <a:fld id="{0A97ED80-8DDA-43A7-A78F-B0542D691D0E}" type="datetime1">
               <a:rPr lang="en-US" smtClean="0"/>
-              <a:t>5/5/2021</a:t>
+              <a:t>5/6/2021</a:t>
             </a:fld>
             <a:endParaRPr lang="en-US"/>
           </a:p>
@@ -5289,7 +5289,7 @@
           <a:p>
             <a:fld id="{0AF827E6-45BA-40D2-98F2-BE4FFF095577}" type="datetime1">
               <a:rPr lang="en-US" smtClean="0"/>
-              <a:t>5/5/2021</a:t>
+              <a:t>5/6/2021</a:t>
             </a:fld>
             <a:endParaRPr lang="en-US"/>
           </a:p>
@@ -5566,7 +5566,7 @@
           <a:p>
             <a:fld id="{42BD114C-22EA-4B1A-A45B-ED6465C7BB4E}" type="datetime1">
               <a:rPr lang="en-US" smtClean="0"/>
-              <a:t>5/5/2021</a:t>
+              <a:t>5/6/2021</a:t>
             </a:fld>
             <a:endParaRPr lang="en-US"/>
           </a:p>
@@ -5819,7 +5819,7 @@
           <a:p>
             <a:fld id="{F46F8903-38BE-4FD8-98FC-E4EF771B2D8C}" type="datetime1">
               <a:rPr lang="en-US" smtClean="0"/>
-              <a:t>5/5/2021</a:t>
+              <a:t>5/6/2021</a:t>
             </a:fld>
             <a:endParaRPr lang="en-US"/>
           </a:p>
@@ -6032,7 +6032,7 @@
           <a:p>
             <a:fld id="{A91AC8C7-9CA9-4E83-8CE3-AD3BE4150B39}" type="datetime1">
               <a:rPr lang="en-US" smtClean="0"/>
-              <a:t>5/5/2021</a:t>
+              <a:t>5/6/2021</a:t>
             </a:fld>
             <a:endParaRPr lang="en-US"/>
           </a:p>
@@ -8978,81 +8978,6 @@
           </a:p>
         </p:txBody>
       </p:sp>
-      <p:sp>
-        <p:nvSpPr>
-          <p:cNvPr id="34" name="TextBox 33">
-            <a:extLst>
-              <a:ext uri="{FF2B5EF4-FFF2-40B4-BE49-F238E27FC236}">
-                <a16:creationId xmlns:a16="http://schemas.microsoft.com/office/drawing/2014/main" id="{8C7E4E0D-C4CE-4090-A83A-CB4BEB3F0332}"/>
-              </a:ext>
-            </a:extLst>
-          </p:cNvPr>
-          <p:cNvSpPr txBox="1"/>
-          <p:nvPr/>
-        </p:nvSpPr>
-        <p:spPr>
-          <a:xfrm>
-            <a:off x="8610600" y="3758039"/>
-            <a:ext cx="2743200" cy="830997"/>
-          </a:xfrm>
-          <a:prstGeom prst="rect">
-            <a:avLst/>
-          </a:prstGeom>
-          <a:noFill/>
-        </p:spPr>
-        <p:txBody>
-          <a:bodyPr wrap="square">
-            <a:spAutoFit/>
-          </a:bodyPr>
-          <a:lstStyle/>
-          <a:p>
-            <a:pPr algn="r"/>
-            <a:r>
-              <a:rPr lang="en-US" sz="2400" i="1"/>
-              <a:t>both suffer from the cold-start problem</a:t>
-            </a:r>
-          </a:p>
-        </p:txBody>
-      </p:sp>
-      <p:pic>
-        <p:nvPicPr>
-          <p:cNvPr id="3" name="Graphic 2" descr="Lightning bolt with solid fill">
-            <a:extLst>
-              <a:ext uri="{FF2B5EF4-FFF2-40B4-BE49-F238E27FC236}">
-                <a16:creationId xmlns:a16="http://schemas.microsoft.com/office/drawing/2014/main" id="{C8450D8E-5339-4AB8-92D8-B1C50FF58787}"/>
-              </a:ext>
-            </a:extLst>
-          </p:cNvPr>
-          <p:cNvPicPr>
-            <a:picLocks noChangeAspect="1"/>
-          </p:cNvPicPr>
-          <p:nvPr/>
-        </p:nvPicPr>
-        <p:blipFill>
-          <a:blip r:embed="rId3">
-            <a:extLst>
-              <a:ext uri="{28A0092B-C50C-407E-A947-70E740481C1C}">
-                <a14:useLocalDpi xmlns:a14="http://schemas.microsoft.com/office/drawing/2010/main" val="0"/>
-              </a:ext>
-              <a:ext uri="{96DAC541-7B7A-43D3-8B79-37D633B846F1}">
-                <asvg:svgBlip xmlns:asvg="http://schemas.microsoft.com/office/drawing/2016/SVG/main" r:embed="rId4"/>
-              </a:ext>
-            </a:extLst>
-          </a:blip>
-          <a:stretch>
-            <a:fillRect/>
-          </a:stretch>
-        </p:blipFill>
-        <p:spPr>
-          <a:xfrm>
-            <a:off x="7833360" y="3716337"/>
-            <a:ext cx="914400" cy="914400"/>
-          </a:xfrm>
-          <a:prstGeom prst="rect">
-            <a:avLst/>
-          </a:prstGeom>
-        </p:spPr>
-      </p:pic>
       <p:pic>
         <p:nvPicPr>
           <p:cNvPr id="8" name="Graphic 7" descr="Badge Follow with solid fill">
@@ -9068,13 +8993,13 @@
           <p:nvPr/>
         </p:nvPicPr>
         <p:blipFill>
-          <a:blip r:embed="rId5" cstate="print">
+          <a:blip r:embed="rId3" cstate="print">
             <a:extLst>
               <a:ext uri="{28A0092B-C50C-407E-A947-70E740481C1C}">
                 <a14:useLocalDpi xmlns:a14="http://schemas.microsoft.com/office/drawing/2010/main" val="0"/>
               </a:ext>
               <a:ext uri="{96DAC541-7B7A-43D3-8B79-37D633B846F1}">
-                <asvg:svgBlip xmlns:asvg="http://schemas.microsoft.com/office/drawing/2016/SVG/main" r:embed="rId6"/>
+                <asvg:svgBlip xmlns:asvg="http://schemas.microsoft.com/office/drawing/2016/SVG/main" r:embed="rId4"/>
               </a:ext>
             </a:extLst>
           </a:blip>
@@ -9107,13 +9032,13 @@
           <p:nvPr/>
         </p:nvPicPr>
         <p:blipFill>
-          <a:blip r:embed="rId7" cstate="print">
+          <a:blip r:embed="rId5" cstate="print">
             <a:extLst>
               <a:ext uri="{28A0092B-C50C-407E-A947-70E740481C1C}">
                 <a14:useLocalDpi xmlns:a14="http://schemas.microsoft.com/office/drawing/2010/main" val="0"/>
               </a:ext>
               <a:ext uri="{96DAC541-7B7A-43D3-8B79-37D633B846F1}">
-                <asvg:svgBlip xmlns:asvg="http://schemas.microsoft.com/office/drawing/2016/SVG/main" r:embed="rId8"/>
+                <asvg:svgBlip xmlns:asvg="http://schemas.microsoft.com/office/drawing/2016/SVG/main" r:embed="rId6"/>
               </a:ext>
             </a:extLst>
           </a:blip>
@@ -9146,13 +9071,13 @@
           <p:nvPr/>
         </p:nvPicPr>
         <p:blipFill>
-          <a:blip r:embed="rId5" cstate="print">
+          <a:blip r:embed="rId3" cstate="print">
             <a:extLst>
               <a:ext uri="{28A0092B-C50C-407E-A947-70E740481C1C}">
                 <a14:useLocalDpi xmlns:a14="http://schemas.microsoft.com/office/drawing/2010/main" val="0"/>
               </a:ext>
               <a:ext uri="{96DAC541-7B7A-43D3-8B79-37D633B846F1}">
-                <asvg:svgBlip xmlns:asvg="http://schemas.microsoft.com/office/drawing/2016/SVG/main" r:embed="rId6"/>
+                <asvg:svgBlip xmlns:asvg="http://schemas.microsoft.com/office/drawing/2016/SVG/main" r:embed="rId4"/>
               </a:ext>
             </a:extLst>
           </a:blip>
@@ -9185,13 +9110,13 @@
           <p:nvPr/>
         </p:nvPicPr>
         <p:blipFill>
-          <a:blip r:embed="rId7" cstate="print">
+          <a:blip r:embed="rId5" cstate="print">
             <a:extLst>
               <a:ext uri="{28A0092B-C50C-407E-A947-70E740481C1C}">
                 <a14:useLocalDpi xmlns:a14="http://schemas.microsoft.com/office/drawing/2010/main" val="0"/>
               </a:ext>
               <a:ext uri="{96DAC541-7B7A-43D3-8B79-37D633B846F1}">
-                <asvg:svgBlip xmlns:asvg="http://schemas.microsoft.com/office/drawing/2016/SVG/main" r:embed="rId8"/>
+                <asvg:svgBlip xmlns:asvg="http://schemas.microsoft.com/office/drawing/2016/SVG/main" r:embed="rId6"/>
               </a:ext>
             </a:extLst>
           </a:blip>
@@ -9224,13 +9149,13 @@
           <p:nvPr/>
         </p:nvPicPr>
         <p:blipFill>
-          <a:blip r:embed="rId5" cstate="print">
+          <a:blip r:embed="rId3" cstate="print">
             <a:extLst>
               <a:ext uri="{28A0092B-C50C-407E-A947-70E740481C1C}">
                 <a14:useLocalDpi xmlns:a14="http://schemas.microsoft.com/office/drawing/2010/main" val="0"/>
               </a:ext>
               <a:ext uri="{96DAC541-7B7A-43D3-8B79-37D633B846F1}">
-                <asvg:svgBlip xmlns:asvg="http://schemas.microsoft.com/office/drawing/2016/SVG/main" r:embed="rId6"/>
+                <asvg:svgBlip xmlns:asvg="http://schemas.microsoft.com/office/drawing/2016/SVG/main" r:embed="rId4"/>
               </a:ext>
             </a:extLst>
           </a:blip>
@@ -9263,13 +9188,13 @@
           <p:nvPr/>
         </p:nvPicPr>
         <p:blipFill>
-          <a:blip r:embed="rId7" cstate="print">
+          <a:blip r:embed="rId5" cstate="print">
             <a:extLst>
               <a:ext uri="{28A0092B-C50C-407E-A947-70E740481C1C}">
                 <a14:useLocalDpi xmlns:a14="http://schemas.microsoft.com/office/drawing/2010/main" val="0"/>
               </a:ext>
               <a:ext uri="{96DAC541-7B7A-43D3-8B79-37D633B846F1}">
-                <asvg:svgBlip xmlns:asvg="http://schemas.microsoft.com/office/drawing/2016/SVG/main" r:embed="rId8"/>
+                <asvg:svgBlip xmlns:asvg="http://schemas.microsoft.com/office/drawing/2016/SVG/main" r:embed="rId6"/>
               </a:ext>
             </a:extLst>
           </a:blip>
@@ -9302,13 +9227,13 @@
           <p:nvPr/>
         </p:nvPicPr>
         <p:blipFill>
-          <a:blip r:embed="rId5" cstate="print">
+          <a:blip r:embed="rId3" cstate="print">
             <a:extLst>
               <a:ext uri="{28A0092B-C50C-407E-A947-70E740481C1C}">
                 <a14:useLocalDpi xmlns:a14="http://schemas.microsoft.com/office/drawing/2010/main" val="0"/>
               </a:ext>
               <a:ext uri="{96DAC541-7B7A-43D3-8B79-37D633B846F1}">
-                <asvg:svgBlip xmlns:asvg="http://schemas.microsoft.com/office/drawing/2016/SVG/main" r:embed="rId6"/>
+                <asvg:svgBlip xmlns:asvg="http://schemas.microsoft.com/office/drawing/2016/SVG/main" r:embed="rId4"/>
               </a:ext>
             </a:extLst>
           </a:blip>
@@ -9341,13 +9266,13 @@
           <p:nvPr/>
         </p:nvPicPr>
         <p:blipFill>
-          <a:blip r:embed="rId7" cstate="print">
+          <a:blip r:embed="rId5" cstate="print">
             <a:extLst>
               <a:ext uri="{28A0092B-C50C-407E-A947-70E740481C1C}">
                 <a14:useLocalDpi xmlns:a14="http://schemas.microsoft.com/office/drawing/2010/main" val="0"/>
               </a:ext>
               <a:ext uri="{96DAC541-7B7A-43D3-8B79-37D633B846F1}">
-                <asvg:svgBlip xmlns:asvg="http://schemas.microsoft.com/office/drawing/2016/SVG/main" r:embed="rId8"/>
+                <asvg:svgBlip xmlns:asvg="http://schemas.microsoft.com/office/drawing/2016/SVG/main" r:embed="rId6"/>
               </a:ext>
             </a:extLst>
           </a:blip>

</xml_diff>